<commit_message>
world 및 state 기본틀 (Drill 09 참고)
world 및 state 기본틀 (Drill 09 참고)
</commit_message>
<xml_diff>
--- a/2018180040 - 2DGP 1차 발표 프레젠테이션.pptx
+++ b/2018180040 - 2DGP 1차 발표 프레젠테이션.pptx
@@ -456,7 +456,7 @@
           <a:p>
             <a:fld id="{DBF6530E-0AAB-4982-8875-378F565153E0}" type="datetimeFigureOut">
               <a:rPr lang="ko-KR" altLang="en-US" smtClean="0"/>
-              <a:t>2023-10-12</a:t>
+              <a:t>2023-10-16</a:t>
             </a:fld>
             <a:endParaRPr lang="ko-KR" altLang="en-US"/>
           </a:p>
@@ -1544,7 +1544,7 @@
           <a:p>
             <a:fld id="{DBF6530E-0AAB-4982-8875-378F565153E0}" type="datetimeFigureOut">
               <a:rPr lang="ko-KR" altLang="en-US" smtClean="0"/>
-              <a:t>2023-10-12</a:t>
+              <a:t>2023-10-16</a:t>
             </a:fld>
             <a:endParaRPr lang="ko-KR" altLang="en-US"/>
           </a:p>
@@ -2524,7 +2524,7 @@
           <a:p>
             <a:fld id="{DBF6530E-0AAB-4982-8875-378F565153E0}" type="datetimeFigureOut">
               <a:rPr lang="ko-KR" altLang="en-US" smtClean="0"/>
-              <a:t>2023-10-12</a:t>
+              <a:t>2023-10-16</a:t>
             </a:fld>
             <a:endParaRPr lang="ko-KR" altLang="en-US"/>
           </a:p>
@@ -3658,7 +3658,7 @@
           <a:p>
             <a:fld id="{DBF6530E-0AAB-4982-8875-378F565153E0}" type="datetimeFigureOut">
               <a:rPr lang="ko-KR" altLang="en-US" smtClean="0"/>
-              <a:t>2023-10-12</a:t>
+              <a:t>2023-10-16</a:t>
             </a:fld>
             <a:endParaRPr lang="ko-KR" altLang="en-US"/>
           </a:p>
@@ -4691,7 +4691,7 @@
           <a:p>
             <a:fld id="{DBF6530E-0AAB-4982-8875-378F565153E0}" type="datetimeFigureOut">
               <a:rPr lang="ko-KR" altLang="en-US" smtClean="0"/>
-              <a:t>2023-10-12</a:t>
+              <a:t>2023-10-16</a:t>
             </a:fld>
             <a:endParaRPr lang="ko-KR" altLang="en-US"/>
           </a:p>
@@ -5351,7 +5351,7 @@
           <a:p>
             <a:fld id="{DBF6530E-0AAB-4982-8875-378F565153E0}" type="datetimeFigureOut">
               <a:rPr lang="ko-KR" altLang="en-US" smtClean="0"/>
-              <a:t>2023-10-12</a:t>
+              <a:t>2023-10-16</a:t>
             </a:fld>
             <a:endParaRPr lang="ko-KR" altLang="en-US"/>
           </a:p>
@@ -6212,7 +6212,7 @@
           <a:p>
             <a:fld id="{DBF6530E-0AAB-4982-8875-378F565153E0}" type="datetimeFigureOut">
               <a:rPr lang="ko-KR" altLang="en-US" smtClean="0"/>
-              <a:t>2023-10-12</a:t>
+              <a:t>2023-10-16</a:t>
             </a:fld>
             <a:endParaRPr lang="ko-KR" altLang="en-US"/>
           </a:p>
@@ -6402,7 +6402,7 @@
           <a:p>
             <a:fld id="{DBF6530E-0AAB-4982-8875-378F565153E0}" type="datetimeFigureOut">
               <a:rPr lang="ko-KR" altLang="en-US" smtClean="0"/>
-              <a:t>2023-10-12</a:t>
+              <a:t>2023-10-16</a:t>
             </a:fld>
             <a:endParaRPr lang="ko-KR" altLang="en-US"/>
           </a:p>
@@ -7374,7 +7374,7 @@
           <a:p>
             <a:fld id="{DBF6530E-0AAB-4982-8875-378F565153E0}" type="datetimeFigureOut">
               <a:rPr lang="ko-KR" altLang="en-US" smtClean="0"/>
-              <a:t>2023-10-12</a:t>
+              <a:t>2023-10-16</a:t>
             </a:fld>
             <a:endParaRPr lang="ko-KR" altLang="en-US"/>
           </a:p>
@@ -7585,7 +7585,7 @@
           <a:p>
             <a:fld id="{DBF6530E-0AAB-4982-8875-378F565153E0}" type="datetimeFigureOut">
               <a:rPr lang="ko-KR" altLang="en-US" smtClean="0"/>
-              <a:t>2023-10-12</a:t>
+              <a:t>2023-10-16</a:t>
             </a:fld>
             <a:endParaRPr lang="ko-KR" altLang="en-US"/>
           </a:p>
@@ -8619,7 +8619,7 @@
           <a:p>
             <a:fld id="{DBF6530E-0AAB-4982-8875-378F565153E0}" type="datetimeFigureOut">
               <a:rPr lang="ko-KR" altLang="en-US" smtClean="0"/>
-              <a:t>2023-10-12</a:t>
+              <a:t>2023-10-16</a:t>
             </a:fld>
             <a:endParaRPr lang="ko-KR" altLang="en-US"/>
           </a:p>
@@ -8891,7 +8891,7 @@
           <a:p>
             <a:fld id="{DBF6530E-0AAB-4982-8875-378F565153E0}" type="datetimeFigureOut">
               <a:rPr lang="ko-KR" altLang="en-US" smtClean="0"/>
-              <a:t>2023-10-12</a:t>
+              <a:t>2023-10-16</a:t>
             </a:fld>
             <a:endParaRPr lang="ko-KR" altLang="en-US"/>
           </a:p>
@@ -9301,7 +9301,7 @@
           <a:p>
             <a:fld id="{DBF6530E-0AAB-4982-8875-378F565153E0}" type="datetimeFigureOut">
               <a:rPr lang="ko-KR" altLang="en-US" smtClean="0"/>
-              <a:t>2023-10-12</a:t>
+              <a:t>2023-10-16</a:t>
             </a:fld>
             <a:endParaRPr lang="ko-KR" altLang="en-US"/>
           </a:p>
@@ -9428,7 +9428,7 @@
           <a:p>
             <a:fld id="{DBF6530E-0AAB-4982-8875-378F565153E0}" type="datetimeFigureOut">
               <a:rPr lang="ko-KR" altLang="en-US" smtClean="0"/>
-              <a:t>2023-10-12</a:t>
+              <a:t>2023-10-16</a:t>
             </a:fld>
             <a:endParaRPr lang="ko-KR" altLang="en-US"/>
           </a:p>
@@ -9523,7 +9523,7 @@
           <a:p>
             <a:fld id="{DBF6530E-0AAB-4982-8875-378F565153E0}" type="datetimeFigureOut">
               <a:rPr lang="ko-KR" altLang="en-US" smtClean="0"/>
-              <a:t>2023-10-12</a:t>
+              <a:t>2023-10-16</a:t>
             </a:fld>
             <a:endParaRPr lang="ko-KR" altLang="en-US"/>
           </a:p>
@@ -10604,7 +10604,7 @@
           <a:p>
             <a:fld id="{DBF6530E-0AAB-4982-8875-378F565153E0}" type="datetimeFigureOut">
               <a:rPr lang="ko-KR" altLang="en-US" smtClean="0"/>
-              <a:t>2023-10-12</a:t>
+              <a:t>2023-10-16</a:t>
             </a:fld>
             <a:endParaRPr lang="ko-KR" altLang="en-US"/>
           </a:p>
@@ -11712,7 +11712,7 @@
           <a:p>
             <a:fld id="{DBF6530E-0AAB-4982-8875-378F565153E0}" type="datetimeFigureOut">
               <a:rPr lang="ko-KR" altLang="en-US" smtClean="0"/>
-              <a:t>2023-10-12</a:t>
+              <a:t>2023-10-16</a:t>
             </a:fld>
             <a:endParaRPr lang="ko-KR" altLang="en-US"/>
           </a:p>
@@ -12709,7 +12709,7 @@
           <a:p>
             <a:fld id="{DBF6530E-0AAB-4982-8875-378F565153E0}" type="datetimeFigureOut">
               <a:rPr lang="ko-KR" altLang="en-US" smtClean="0"/>
-              <a:t>2023-10-12</a:t>
+              <a:t>2023-10-16</a:t>
             </a:fld>
             <a:endParaRPr lang="ko-KR" altLang="en-US"/>
           </a:p>
@@ -16872,7 +16872,7 @@
           <p:nvPr>
             <p:extLst>
               <p:ext uri="{D42A27DB-BD31-4B8C-83A1-F6EECF244321}">
-                <p14:modId xmlns:p14="http://schemas.microsoft.com/office/powerpoint/2010/main" val="2902848807"/>
+                <p14:modId xmlns:p14="http://schemas.microsoft.com/office/powerpoint/2010/main" val="1380463237"/>
               </p:ext>
             </p:extLst>
           </p:nvPr>
@@ -17116,7 +17116,7 @@
                       </a:r>
                       <a:r>
                         <a:rPr lang="ko-KR" altLang="en-US" dirty="0"/>
-                        <a:t>구현</a:t>
+                        <a:t>구현 및 게임 흐름</a:t>
                       </a:r>
                       <a:endParaRPr lang="en-US" altLang="ko-KR" dirty="0"/>
                     </a:p>

</xml_diff>